<commit_message>
Added fdr result plots
</commit_message>
<xml_diff>
--- a/images/copernican_revolution.pptx
+++ b/images/copernican_revolution.pptx
@@ -5,7 +5,8 @@
     <p:sldMasterId id="2147483648" r:id="rId1"/>
   </p:sldMasterIdLst>
   <p:sldIdLst>
-    <p:sldId id="256" r:id="rId2"/>
+    <p:sldId id="257" r:id="rId2"/>
+    <p:sldId id="258" r:id="rId3"/>
   </p:sldIdLst>
   <p:sldSz cx="12192000" cy="6858000"/>
   <p:notesSz cx="6858000" cy="9144000"/>
@@ -259,7 +260,7 @@
           <a:p>
             <a:fld id="{8BEA2FD7-9478-4A9C-B4E3-5FBF9F61798F}" type="datetimeFigureOut">
               <a:rPr lang="en-GB" smtClean="0"/>
-              <a:t>24/07/2024</a:t>
+              <a:t>29/07/2024</a:t>
             </a:fld>
             <a:endParaRPr lang="en-GB"/>
           </a:p>
@@ -457,7 +458,7 @@
           <a:p>
             <a:fld id="{8BEA2FD7-9478-4A9C-B4E3-5FBF9F61798F}" type="datetimeFigureOut">
               <a:rPr lang="en-GB" smtClean="0"/>
-              <a:t>24/07/2024</a:t>
+              <a:t>29/07/2024</a:t>
             </a:fld>
             <a:endParaRPr lang="en-GB"/>
           </a:p>
@@ -665,7 +666,7 @@
           <a:p>
             <a:fld id="{8BEA2FD7-9478-4A9C-B4E3-5FBF9F61798F}" type="datetimeFigureOut">
               <a:rPr lang="en-GB" smtClean="0"/>
-              <a:t>24/07/2024</a:t>
+              <a:t>29/07/2024</a:t>
             </a:fld>
             <a:endParaRPr lang="en-GB"/>
           </a:p>
@@ -863,7 +864,7 @@
           <a:p>
             <a:fld id="{8BEA2FD7-9478-4A9C-B4E3-5FBF9F61798F}" type="datetimeFigureOut">
               <a:rPr lang="en-GB" smtClean="0"/>
-              <a:t>24/07/2024</a:t>
+              <a:t>29/07/2024</a:t>
             </a:fld>
             <a:endParaRPr lang="en-GB"/>
           </a:p>
@@ -1138,7 +1139,7 @@
           <a:p>
             <a:fld id="{8BEA2FD7-9478-4A9C-B4E3-5FBF9F61798F}" type="datetimeFigureOut">
               <a:rPr lang="en-GB" smtClean="0"/>
-              <a:t>24/07/2024</a:t>
+              <a:t>29/07/2024</a:t>
             </a:fld>
             <a:endParaRPr lang="en-GB"/>
           </a:p>
@@ -1403,7 +1404,7 @@
           <a:p>
             <a:fld id="{8BEA2FD7-9478-4A9C-B4E3-5FBF9F61798F}" type="datetimeFigureOut">
               <a:rPr lang="en-GB" smtClean="0"/>
-              <a:t>24/07/2024</a:t>
+              <a:t>29/07/2024</a:t>
             </a:fld>
             <a:endParaRPr lang="en-GB"/>
           </a:p>
@@ -1815,7 +1816,7 @@
           <a:p>
             <a:fld id="{8BEA2FD7-9478-4A9C-B4E3-5FBF9F61798F}" type="datetimeFigureOut">
               <a:rPr lang="en-GB" smtClean="0"/>
-              <a:t>24/07/2024</a:t>
+              <a:t>29/07/2024</a:t>
             </a:fld>
             <a:endParaRPr lang="en-GB"/>
           </a:p>
@@ -1956,7 +1957,7 @@
           <a:p>
             <a:fld id="{8BEA2FD7-9478-4A9C-B4E3-5FBF9F61798F}" type="datetimeFigureOut">
               <a:rPr lang="en-GB" smtClean="0"/>
-              <a:t>24/07/2024</a:t>
+              <a:t>29/07/2024</a:t>
             </a:fld>
             <a:endParaRPr lang="en-GB"/>
           </a:p>
@@ -2069,7 +2070,7 @@
           <a:p>
             <a:fld id="{8BEA2FD7-9478-4A9C-B4E3-5FBF9F61798F}" type="datetimeFigureOut">
               <a:rPr lang="en-GB" smtClean="0"/>
-              <a:t>24/07/2024</a:t>
+              <a:t>29/07/2024</a:t>
             </a:fld>
             <a:endParaRPr lang="en-GB"/>
           </a:p>
@@ -2380,7 +2381,7 @@
           <a:p>
             <a:fld id="{8BEA2FD7-9478-4A9C-B4E3-5FBF9F61798F}" type="datetimeFigureOut">
               <a:rPr lang="en-GB" smtClean="0"/>
-              <a:t>24/07/2024</a:t>
+              <a:t>29/07/2024</a:t>
             </a:fld>
             <a:endParaRPr lang="en-GB"/>
           </a:p>
@@ -2668,7 +2669,7 @@
           <a:p>
             <a:fld id="{8BEA2FD7-9478-4A9C-B4E3-5FBF9F61798F}" type="datetimeFigureOut">
               <a:rPr lang="en-GB" smtClean="0"/>
-              <a:t>24/07/2024</a:t>
+              <a:t>29/07/2024</a:t>
             </a:fld>
             <a:endParaRPr lang="en-GB"/>
           </a:p>
@@ -2909,7 +2910,7 @@
           <a:p>
             <a:fld id="{8BEA2FD7-9478-4A9C-B4E3-5FBF9F61798F}" type="datetimeFigureOut">
               <a:rPr lang="en-GB" smtClean="0"/>
-              <a:t>24/07/2024</a:t>
+              <a:t>29/07/2024</a:t>
             </a:fld>
             <a:endParaRPr lang="en-GB"/>
           </a:p>
@@ -3662,7 +3663,7 @@
         <p:spPr>
           <a:xfrm>
             <a:off x="1971497" y="5865771"/>
-            <a:ext cx="3169009" cy="369332"/>
+            <a:ext cx="3169009" cy="646331"/>
           </a:xfrm>
           <a:prstGeom prst="rect">
             <a:avLst/>
@@ -3677,6 +3678,12 @@
           <a:p>
             <a:r>
               <a:rPr lang="en-GB" dirty="0"/>
+              <a:t>Data is fixed</a:t>
+            </a:r>
+          </a:p>
+          <a:p>
+            <a:r>
+              <a:rPr lang="en-GB" dirty="0"/>
               <a:t>Centred on P[data | null model]</a:t>
             </a:r>
           </a:p>
@@ -3696,8 +3703,8 @@
         </p:nvSpPr>
         <p:spPr>
           <a:xfrm>
-            <a:off x="7628522" y="5865771"/>
-            <a:ext cx="2766655" cy="369332"/>
+            <a:off x="7153735" y="5865770"/>
+            <a:ext cx="4067332" cy="646331"/>
           </a:xfrm>
           <a:prstGeom prst="rect">
             <a:avLst/>
@@ -3712,7 +3719,21 @@
           <a:p>
             <a:r>
               <a:rPr lang="en-GB" dirty="0"/>
-              <a:t>Centred on P[model | data]</a:t>
+              <a:t>Data &amp; observation process are uncertain</a:t>
+            </a:r>
+          </a:p>
+          <a:p>
+            <a:r>
+              <a:rPr lang="en-GB" dirty="0"/>
+              <a:t>Centred on P[model, </a:t>
+            </a:r>
+            <a:r>
+              <a:rPr lang="en-GB" dirty="0" err="1"/>
+              <a:t>obs</a:t>
+            </a:r>
+            <a:r>
+              <a:rPr lang="en-GB" dirty="0"/>
+              <a:t> process | data]</a:t>
             </a:r>
           </a:p>
         </p:txBody>
@@ -3787,10 +3808,133 @@
           </a:p>
         </p:txBody>
       </p:sp>
+      <p:sp>
+        <p:nvSpPr>
+          <p:cNvPr id="5" name="Flowchart: Connector 4">
+            <a:extLst>
+              <a:ext uri="{FF2B5EF4-FFF2-40B4-BE49-F238E27FC236}">
+                <a16:creationId xmlns:a16="http://schemas.microsoft.com/office/drawing/2014/main" id="{C48A31EF-383D-D3CB-7B30-0BE13534D585}"/>
+              </a:ext>
+            </a:extLst>
+          </p:cNvPr>
+          <p:cNvSpPr/>
+          <p:nvPr/>
+        </p:nvSpPr>
+        <p:spPr>
+          <a:xfrm>
+            <a:off x="7426400" y="2981084"/>
+            <a:ext cx="1618019" cy="1575979"/>
+          </a:xfrm>
+          <a:prstGeom prst="flowChartConnector">
+            <a:avLst/>
+          </a:prstGeom>
+          <a:noFill/>
+          <a:ln>
+            <a:prstDash val="dash"/>
+          </a:ln>
+        </p:spPr>
+        <p:style>
+          <a:lnRef idx="2">
+            <a:schemeClr val="accent3"/>
+          </a:lnRef>
+          <a:fillRef idx="1">
+            <a:schemeClr val="lt1"/>
+          </a:fillRef>
+          <a:effectRef idx="0">
+            <a:schemeClr val="accent3"/>
+          </a:effectRef>
+          <a:fontRef idx="minor">
+            <a:schemeClr val="dk1"/>
+          </a:fontRef>
+        </p:style>
+        <p:txBody>
+          <a:bodyPr rtlCol="0" anchor="ctr"/>
+          <a:lstStyle/>
+          <a:p>
+            <a:pPr algn="ctr"/>
+            <a:endParaRPr lang="en-GB" dirty="0">
+              <a:solidFill>
+                <a:schemeClr val="tx1"/>
+              </a:solidFill>
+            </a:endParaRPr>
+          </a:p>
+        </p:txBody>
+      </p:sp>
+      <p:sp>
+        <p:nvSpPr>
+          <p:cNvPr id="11" name="Star: 24 Points 10">
+            <a:extLst>
+              <a:ext uri="{FF2B5EF4-FFF2-40B4-BE49-F238E27FC236}">
+                <a16:creationId xmlns:a16="http://schemas.microsoft.com/office/drawing/2014/main" id="{5DB1D25A-B143-BA08-21A6-087D7136E89A}"/>
+              </a:ext>
+            </a:extLst>
+          </p:cNvPr>
+          <p:cNvSpPr>
+            <a:spLocks noChangeAspect="1"/>
+          </p:cNvSpPr>
+          <p:nvPr/>
+        </p:nvSpPr>
+        <p:spPr>
+          <a:xfrm>
+            <a:off x="8331892" y="3965951"/>
+            <a:ext cx="1425053" cy="704738"/>
+          </a:xfrm>
+          <a:prstGeom prst="star24">
+            <a:avLst/>
+          </a:prstGeom>
+        </p:spPr>
+        <p:style>
+          <a:lnRef idx="2">
+            <a:schemeClr val="accent4">
+              <a:shade val="15000"/>
+            </a:schemeClr>
+          </a:lnRef>
+          <a:fillRef idx="1">
+            <a:schemeClr val="accent4"/>
+          </a:fillRef>
+          <a:effectRef idx="0">
+            <a:schemeClr val="accent4"/>
+          </a:effectRef>
+          <a:fontRef idx="minor">
+            <a:schemeClr val="lt1"/>
+          </a:fontRef>
+        </p:style>
+        <p:txBody>
+          <a:bodyPr rtlCol="0" anchor="ctr"/>
+          <a:lstStyle/>
+          <a:p>
+            <a:pPr algn="ctr"/>
+            <a:r>
+              <a:rPr lang="en-GB" sz="1400" dirty="0" err="1">
+                <a:solidFill>
+                  <a:schemeClr val="tx1"/>
+                </a:solidFill>
+              </a:rPr>
+              <a:t>obs</a:t>
+            </a:r>
+            <a:endParaRPr lang="en-GB" sz="1400" dirty="0">
+              <a:solidFill>
+                <a:schemeClr val="tx1"/>
+              </a:solidFill>
+            </a:endParaRPr>
+          </a:p>
+          <a:p>
+            <a:pPr algn="ctr"/>
+            <a:r>
+              <a:rPr lang="en-GB" sz="1400" dirty="0">
+                <a:solidFill>
+                  <a:schemeClr val="tx1"/>
+                </a:solidFill>
+              </a:rPr>
+              <a:t>process</a:t>
+            </a:r>
+          </a:p>
+        </p:txBody>
+      </p:sp>
     </p:spTree>
     <p:extLst>
       <p:ext uri="{BB962C8B-B14F-4D97-AF65-F5344CB8AC3E}">
-        <p14:creationId xmlns:p14="http://schemas.microsoft.com/office/powerpoint/2010/main" val="161386462"/>
+        <p14:creationId xmlns:p14="http://schemas.microsoft.com/office/powerpoint/2010/main" val="281915412"/>
       </p:ext>
     </p:extLst>
   </p:cSld>
@@ -4105,6 +4249,120 @@
                                   </p:childTnLst>
                                 </p:cTn>
                               </p:par>
+                              <p:par>
+                                <p:cTn id="31" presetID="10" presetClass="entr" presetSubtype="0" fill="hold" grpId="0" nodeType="withEffect">
+                                  <p:stCondLst>
+                                    <p:cond delay="0"/>
+                                  </p:stCondLst>
+                                  <p:childTnLst>
+                                    <p:set>
+                                      <p:cBhvr>
+                                        <p:cTn id="32" dur="1" fill="hold">
+                                          <p:stCondLst>
+                                            <p:cond delay="0"/>
+                                          </p:stCondLst>
+                                        </p:cTn>
+                                        <p:tgtEl>
+                                          <p:spTgt spid="5"/>
+                                        </p:tgtEl>
+                                        <p:attrNameLst>
+                                          <p:attrName>style.visibility</p:attrName>
+                                        </p:attrNameLst>
+                                      </p:cBhvr>
+                                      <p:to>
+                                        <p:strVal val="visible"/>
+                                      </p:to>
+                                    </p:set>
+                                    <p:animEffect transition="in" filter="fade">
+                                      <p:cBhvr>
+                                        <p:cTn id="33" dur="500"/>
+                                        <p:tgtEl>
+                                          <p:spTgt spid="5"/>
+                                        </p:tgtEl>
+                                      </p:cBhvr>
+                                    </p:animEffect>
+                                  </p:childTnLst>
+                                </p:cTn>
+                              </p:par>
+                              <p:par>
+                                <p:cTn id="34" presetID="1" presetClass="path" presetSubtype="0" repeatCount="2000" accel="50000" decel="50000" fill="hold" grpId="1" nodeType="withEffect">
+                                  <p:stCondLst>
+                                    <p:cond delay="0"/>
+                                  </p:stCondLst>
+                                  <p:childTnLst>
+                                    <p:animMotion origin="layout" path="M 0.04389 -0.18263 C 0.11576 -0.18263 0.175 -0.07407 0.175 0.05996 C 0.175 0.19445 0.11576 0.30487 0.04389 0.30487 C -0.02851 0.30487 -0.08671 0.19445 -0.08671 0.05996 C -0.08671 -0.07407 -0.02851 -0.18263 0.04389 -0.18263 Z " pathEditMode="relative" rAng="0" ptsTypes="AAAAA">
+                                      <p:cBhvr>
+                                        <p:cTn id="35" dur="4600" fill="hold"/>
+                                        <p:tgtEl>
+                                          <p:spTgt spid="5"/>
+                                        </p:tgtEl>
+                                        <p:attrNameLst>
+                                          <p:attrName>ppt_x</p:attrName>
+                                          <p:attrName>ppt_y</p:attrName>
+                                        </p:attrNameLst>
+                                      </p:cBhvr>
+                                      <p:rCtr x="26" y="24375"/>
+                                    </p:animMotion>
+                                  </p:childTnLst>
+                                </p:cTn>
+                              </p:par>
+                              <p:par>
+                                <p:cTn id="36" presetID="10" presetClass="entr" presetSubtype="0" fill="hold" grpId="0" nodeType="withEffect">
+                                  <p:stCondLst>
+                                    <p:cond delay="0"/>
+                                  </p:stCondLst>
+                                  <p:childTnLst>
+                                    <p:set>
+                                      <p:cBhvr>
+                                        <p:cTn id="37" dur="1" fill="hold">
+                                          <p:stCondLst>
+                                            <p:cond delay="0"/>
+                                          </p:stCondLst>
+                                        </p:cTn>
+                                        <p:tgtEl>
+                                          <p:spTgt spid="11"/>
+                                        </p:tgtEl>
+                                        <p:attrNameLst>
+                                          <p:attrName>style.visibility</p:attrName>
+                                        </p:attrNameLst>
+                                      </p:cBhvr>
+                                      <p:to>
+                                        <p:strVal val="visible"/>
+                                      </p:to>
+                                    </p:set>
+                                    <p:animEffect transition="in" filter="fade">
+                                      <p:cBhvr>
+                                        <p:cTn id="38" dur="500"/>
+                                        <p:tgtEl>
+                                          <p:spTgt spid="11"/>
+                                        </p:tgtEl>
+                                      </p:cBhvr>
+                                    </p:animEffect>
+                                  </p:childTnLst>
+                                </p:cTn>
+                              </p:par>
+                              <p:par>
+                                <p:cTn id="39" presetID="1" presetClass="path" presetSubtype="0" repeatCount="2000" accel="50000" decel="50000" fill="hold" grpId="1" nodeType="withEffect">
+                                  <p:stCondLst>
+                                    <p:cond delay="0"/>
+                                  </p:stCondLst>
+                                  <p:childTnLst>
+                                    <p:animMotion origin="layout" path="M 0.04389 -0.18263 C 0.11576 -0.18263 0.175 -0.07407 0.175 0.05996 C 0.175 0.19445 0.11576 0.30487 0.04389 0.30487 C -0.02851 0.30487 -0.08671 0.19445 -0.08671 0.05996 C -0.08671 -0.07407 -0.02851 -0.18263 0.04389 -0.18263 Z " pathEditMode="relative" rAng="0" ptsTypes="AAAAA">
+                                      <p:cBhvr>
+                                        <p:cTn id="40" dur="4600" fill="hold"/>
+                                        <p:tgtEl>
+                                          <p:spTgt spid="11"/>
+                                        </p:tgtEl>
+                                        <p:attrNameLst>
+                                          <p:attrName>ppt_x</p:attrName>
+                                          <p:attrName>ppt_y</p:attrName>
+                                        </p:attrNameLst>
+                                      </p:cBhvr>
+                                      <p:rCtr x="26" y="24375"/>
+                                    </p:animMotion>
+                                  </p:childTnLst>
+                                </p:cTn>
+                              </p:par>
                             </p:childTnLst>
                           </p:cTn>
                         </p:par>
@@ -4140,8 +4398,646 @@
       <p:bldP spid="3" grpId="0" animBg="1"/>
       <p:bldP spid="8" grpId="0"/>
       <p:bldP spid="10" grpId="0"/>
+      <p:bldP spid="5" grpId="0" animBg="1"/>
+      <p:bldP spid="5" grpId="1" animBg="1"/>
+      <p:bldP spid="11" grpId="0" animBg="1"/>
+      <p:bldP spid="11" grpId="1" animBg="1"/>
     </p:bldLst>
   </p:timing>
+</p:sld>
+</file>
+
+<file path=ppt/slides/slide2.xml><?xml version="1.0" encoding="utf-8"?>
+<p:sld xmlns:a="http://schemas.openxmlformats.org/drawingml/2006/main" xmlns:r="http://schemas.openxmlformats.org/officeDocument/2006/relationships" xmlns:p="http://schemas.openxmlformats.org/presentationml/2006/main">
+  <p:cSld>
+    <p:spTree>
+      <p:nvGrpSpPr>
+        <p:cNvPr id="1" name=""/>
+        <p:cNvGrpSpPr/>
+        <p:nvPr/>
+      </p:nvGrpSpPr>
+      <p:grpSpPr>
+        <a:xfrm>
+          <a:off x="0" y="0"/>
+          <a:ext cx="0" cy="0"/>
+          <a:chOff x="0" y="0"/>
+          <a:chExt cx="0" cy="0"/>
+        </a:xfrm>
+      </p:grpSpPr>
+      <p:sp>
+        <p:nvSpPr>
+          <p:cNvPr id="13" name="Flowchart: Connector 12">
+            <a:extLst>
+              <a:ext uri="{FF2B5EF4-FFF2-40B4-BE49-F238E27FC236}">
+                <a16:creationId xmlns:a16="http://schemas.microsoft.com/office/drawing/2014/main" id="{44902685-EE26-5E4B-855F-DC4B36C245A2}"/>
+              </a:ext>
+            </a:extLst>
+          </p:cNvPr>
+          <p:cNvSpPr/>
+          <p:nvPr/>
+        </p:nvSpPr>
+        <p:spPr>
+          <a:xfrm>
+            <a:off x="1691588" y="2452777"/>
+            <a:ext cx="3169009" cy="3328988"/>
+          </a:xfrm>
+          <a:prstGeom prst="flowChartConnector">
+            <a:avLst/>
+          </a:prstGeom>
+          <a:ln>
+            <a:prstDash val="dash"/>
+          </a:ln>
+        </p:spPr>
+        <p:style>
+          <a:lnRef idx="2">
+            <a:schemeClr val="accent3"/>
+          </a:lnRef>
+          <a:fillRef idx="1">
+            <a:schemeClr val="lt1"/>
+          </a:fillRef>
+          <a:effectRef idx="0">
+            <a:schemeClr val="accent3"/>
+          </a:effectRef>
+          <a:fontRef idx="minor">
+            <a:schemeClr val="dk1"/>
+          </a:fontRef>
+        </p:style>
+        <p:txBody>
+          <a:bodyPr rtlCol="0" anchor="ctr"/>
+          <a:lstStyle/>
+          <a:p>
+            <a:pPr algn="ctr"/>
+            <a:endParaRPr lang="en-GB" dirty="0">
+              <a:solidFill>
+                <a:schemeClr val="tx1"/>
+              </a:solidFill>
+            </a:endParaRPr>
+          </a:p>
+        </p:txBody>
+      </p:sp>
+      <p:sp>
+        <p:nvSpPr>
+          <p:cNvPr id="14" name="Flowchart: Connector 13">
+            <a:extLst>
+              <a:ext uri="{FF2B5EF4-FFF2-40B4-BE49-F238E27FC236}">
+                <a16:creationId xmlns:a16="http://schemas.microsoft.com/office/drawing/2014/main" id="{412F6861-7225-9CD0-BD6B-B5D4B095DC92}"/>
+              </a:ext>
+            </a:extLst>
+          </p:cNvPr>
+          <p:cNvSpPr/>
+          <p:nvPr/>
+        </p:nvSpPr>
+        <p:spPr>
+          <a:xfrm>
+            <a:off x="7153735" y="2438921"/>
+            <a:ext cx="3169009" cy="3328988"/>
+          </a:xfrm>
+          <a:prstGeom prst="flowChartConnector">
+            <a:avLst/>
+          </a:prstGeom>
+          <a:ln>
+            <a:prstDash val="dash"/>
+          </a:ln>
+        </p:spPr>
+        <p:style>
+          <a:lnRef idx="2">
+            <a:schemeClr val="accent3"/>
+          </a:lnRef>
+          <a:fillRef idx="1">
+            <a:schemeClr val="lt1"/>
+          </a:fillRef>
+          <a:effectRef idx="0">
+            <a:schemeClr val="accent3"/>
+          </a:effectRef>
+          <a:fontRef idx="minor">
+            <a:schemeClr val="dk1"/>
+          </a:fontRef>
+        </p:style>
+        <p:txBody>
+          <a:bodyPr rtlCol="0" anchor="ctr"/>
+          <a:lstStyle/>
+          <a:p>
+            <a:pPr algn="ctr"/>
+            <a:endParaRPr lang="en-GB" dirty="0">
+              <a:solidFill>
+                <a:schemeClr val="tx1"/>
+              </a:solidFill>
+            </a:endParaRPr>
+          </a:p>
+        </p:txBody>
+      </p:sp>
+      <p:sp>
+        <p:nvSpPr>
+          <p:cNvPr id="4" name="Oval 3">
+            <a:extLst>
+              <a:ext uri="{FF2B5EF4-FFF2-40B4-BE49-F238E27FC236}">
+                <a16:creationId xmlns:a16="http://schemas.microsoft.com/office/drawing/2014/main" id="{E3C3F0E6-A7E3-84D3-06F6-A69BAA72AB05}"/>
+              </a:ext>
+            </a:extLst>
+          </p:cNvPr>
+          <p:cNvSpPr>
+            <a:spLocks noChangeAspect="1"/>
+          </p:cNvSpPr>
+          <p:nvPr/>
+        </p:nvSpPr>
+        <p:spPr>
+          <a:xfrm>
+            <a:off x="9468790" y="2452777"/>
+            <a:ext cx="853954" cy="853954"/>
+          </a:xfrm>
+          <a:prstGeom prst="ellipse">
+            <a:avLst/>
+          </a:prstGeom>
+        </p:spPr>
+        <p:style>
+          <a:lnRef idx="2">
+            <a:schemeClr val="accent1">
+              <a:shade val="15000"/>
+            </a:schemeClr>
+          </a:lnRef>
+          <a:fillRef idx="1">
+            <a:schemeClr val="accent1"/>
+          </a:fillRef>
+          <a:effectRef idx="0">
+            <a:schemeClr val="accent1"/>
+          </a:effectRef>
+          <a:fontRef idx="minor">
+            <a:schemeClr val="lt1"/>
+          </a:fontRef>
+        </p:style>
+        <p:txBody>
+          <a:bodyPr rtlCol="0" anchor="ctr"/>
+          <a:lstStyle/>
+          <a:p>
+            <a:pPr algn="ctr"/>
+            <a:r>
+              <a:rPr lang="en-GB" sz="1400" dirty="0"/>
+              <a:t>data</a:t>
+            </a:r>
+          </a:p>
+        </p:txBody>
+      </p:sp>
+      <p:sp>
+        <p:nvSpPr>
+          <p:cNvPr id="6" name="Star: 24 Points 5">
+            <a:extLst>
+              <a:ext uri="{FF2B5EF4-FFF2-40B4-BE49-F238E27FC236}">
+                <a16:creationId xmlns:a16="http://schemas.microsoft.com/office/drawing/2014/main" id="{7712B051-0BFF-8DC8-A6BB-B580C620CF8E}"/>
+              </a:ext>
+            </a:extLst>
+          </p:cNvPr>
+          <p:cNvSpPr/>
+          <p:nvPr/>
+        </p:nvSpPr>
+        <p:spPr>
+          <a:xfrm>
+            <a:off x="7970593" y="3249562"/>
+            <a:ext cx="1562470" cy="1562470"/>
+          </a:xfrm>
+          <a:prstGeom prst="star24">
+            <a:avLst/>
+          </a:prstGeom>
+        </p:spPr>
+        <p:style>
+          <a:lnRef idx="2">
+            <a:schemeClr val="accent4">
+              <a:shade val="15000"/>
+            </a:schemeClr>
+          </a:lnRef>
+          <a:fillRef idx="1">
+            <a:schemeClr val="accent4"/>
+          </a:fillRef>
+          <a:effectRef idx="0">
+            <a:schemeClr val="accent4"/>
+          </a:effectRef>
+          <a:fontRef idx="minor">
+            <a:schemeClr val="lt1"/>
+          </a:fontRef>
+        </p:style>
+        <p:txBody>
+          <a:bodyPr rtlCol="0" anchor="ctr"/>
+          <a:lstStyle/>
+          <a:p>
+            <a:pPr algn="ctr"/>
+            <a:r>
+              <a:rPr lang="en-GB" dirty="0">
+                <a:solidFill>
+                  <a:schemeClr val="tx1"/>
+                </a:solidFill>
+              </a:rPr>
+              <a:t>model</a:t>
+            </a:r>
+          </a:p>
+        </p:txBody>
+      </p:sp>
+      <p:sp>
+        <p:nvSpPr>
+          <p:cNvPr id="2" name="Oval 1">
+            <a:extLst>
+              <a:ext uri="{FF2B5EF4-FFF2-40B4-BE49-F238E27FC236}">
+                <a16:creationId xmlns:a16="http://schemas.microsoft.com/office/drawing/2014/main" id="{79D7F003-35DC-EC68-E7F0-93AF6F097DD5}"/>
+              </a:ext>
+            </a:extLst>
+          </p:cNvPr>
+          <p:cNvSpPr/>
+          <p:nvPr/>
+        </p:nvSpPr>
+        <p:spPr>
+          <a:xfrm>
+            <a:off x="2708610" y="3549789"/>
+            <a:ext cx="1134964" cy="1134964"/>
+          </a:xfrm>
+          <a:prstGeom prst="ellipse">
+            <a:avLst/>
+          </a:prstGeom>
+        </p:spPr>
+        <p:style>
+          <a:lnRef idx="2">
+            <a:schemeClr val="accent1">
+              <a:shade val="15000"/>
+            </a:schemeClr>
+          </a:lnRef>
+          <a:fillRef idx="1">
+            <a:schemeClr val="accent1"/>
+          </a:fillRef>
+          <a:effectRef idx="0">
+            <a:schemeClr val="accent1"/>
+          </a:effectRef>
+          <a:fontRef idx="minor">
+            <a:schemeClr val="lt1"/>
+          </a:fontRef>
+        </p:style>
+        <p:txBody>
+          <a:bodyPr rtlCol="0" anchor="ctr"/>
+          <a:lstStyle/>
+          <a:p>
+            <a:pPr algn="ctr"/>
+            <a:r>
+              <a:rPr lang="en-GB" dirty="0"/>
+              <a:t>data</a:t>
+            </a:r>
+          </a:p>
+        </p:txBody>
+      </p:sp>
+      <p:sp>
+        <p:nvSpPr>
+          <p:cNvPr id="3" name="Star: 24 Points 2">
+            <a:extLst>
+              <a:ext uri="{FF2B5EF4-FFF2-40B4-BE49-F238E27FC236}">
+                <a16:creationId xmlns:a16="http://schemas.microsoft.com/office/drawing/2014/main" id="{925DCF2B-3882-CD38-7751-1F52AFE65CEB}"/>
+              </a:ext>
+            </a:extLst>
+          </p:cNvPr>
+          <p:cNvSpPr>
+            <a:spLocks noChangeAspect="1"/>
+          </p:cNvSpPr>
+          <p:nvPr/>
+        </p:nvSpPr>
+        <p:spPr>
+          <a:xfrm>
+            <a:off x="3725633" y="2294036"/>
+            <a:ext cx="1134964" cy="1134964"/>
+          </a:xfrm>
+          <a:prstGeom prst="star24">
+            <a:avLst/>
+          </a:prstGeom>
+        </p:spPr>
+        <p:style>
+          <a:lnRef idx="2">
+            <a:schemeClr val="accent4">
+              <a:shade val="15000"/>
+            </a:schemeClr>
+          </a:lnRef>
+          <a:fillRef idx="1">
+            <a:schemeClr val="accent4"/>
+          </a:fillRef>
+          <a:effectRef idx="0">
+            <a:schemeClr val="accent4"/>
+          </a:effectRef>
+          <a:fontRef idx="minor">
+            <a:schemeClr val="lt1"/>
+          </a:fontRef>
+        </p:style>
+        <p:txBody>
+          <a:bodyPr rtlCol="0" anchor="ctr"/>
+          <a:lstStyle/>
+          <a:p>
+            <a:pPr algn="ctr"/>
+            <a:r>
+              <a:rPr lang="en-GB" sz="1200" dirty="0">
+                <a:solidFill>
+                  <a:schemeClr val="tx1"/>
+                </a:solidFill>
+              </a:rPr>
+              <a:t>null</a:t>
+            </a:r>
+          </a:p>
+          <a:p>
+            <a:pPr algn="ctr"/>
+            <a:r>
+              <a:rPr lang="en-GB" sz="1200" dirty="0">
+                <a:solidFill>
+                  <a:schemeClr val="tx1"/>
+                </a:solidFill>
+              </a:rPr>
+              <a:t>model</a:t>
+            </a:r>
+          </a:p>
+        </p:txBody>
+      </p:sp>
+      <p:sp>
+        <p:nvSpPr>
+          <p:cNvPr id="7" name="TextBox 6">
+            <a:extLst>
+              <a:ext uri="{FF2B5EF4-FFF2-40B4-BE49-F238E27FC236}">
+                <a16:creationId xmlns:a16="http://schemas.microsoft.com/office/drawing/2014/main" id="{1DF849E9-48A4-44A3-387B-7668FD9DDB22}"/>
+              </a:ext>
+            </a:extLst>
+          </p:cNvPr>
+          <p:cNvSpPr txBox="1"/>
+          <p:nvPr/>
+        </p:nvSpPr>
+        <p:spPr>
+          <a:xfrm>
+            <a:off x="1971497" y="5865771"/>
+            <a:ext cx="3169009" cy="646331"/>
+          </a:xfrm>
+          <a:prstGeom prst="rect">
+            <a:avLst/>
+          </a:prstGeom>
+          <a:noFill/>
+        </p:spPr>
+        <p:txBody>
+          <a:bodyPr wrap="none" rtlCol="0">
+            <a:spAutoFit/>
+          </a:bodyPr>
+          <a:lstStyle/>
+          <a:p>
+            <a:r>
+              <a:rPr lang="en-GB" dirty="0"/>
+              <a:t>Data is fixed</a:t>
+            </a:r>
+          </a:p>
+          <a:p>
+            <a:r>
+              <a:rPr lang="en-GB" dirty="0"/>
+              <a:t>Centred on P[data | null model]</a:t>
+            </a:r>
+          </a:p>
+        </p:txBody>
+      </p:sp>
+      <p:sp>
+        <p:nvSpPr>
+          <p:cNvPr id="8" name="TextBox 7">
+            <a:extLst>
+              <a:ext uri="{FF2B5EF4-FFF2-40B4-BE49-F238E27FC236}">
+                <a16:creationId xmlns:a16="http://schemas.microsoft.com/office/drawing/2014/main" id="{DB9462D5-CB98-D5FF-EC4C-87EAE2F637BC}"/>
+              </a:ext>
+            </a:extLst>
+          </p:cNvPr>
+          <p:cNvSpPr txBox="1"/>
+          <p:nvPr/>
+        </p:nvSpPr>
+        <p:spPr>
+          <a:xfrm>
+            <a:off x="7153735" y="5865770"/>
+            <a:ext cx="4067332" cy="646331"/>
+          </a:xfrm>
+          <a:prstGeom prst="rect">
+            <a:avLst/>
+          </a:prstGeom>
+          <a:noFill/>
+        </p:spPr>
+        <p:txBody>
+          <a:bodyPr wrap="none" rtlCol="0">
+            <a:spAutoFit/>
+          </a:bodyPr>
+          <a:lstStyle/>
+          <a:p>
+            <a:r>
+              <a:rPr lang="en-GB" dirty="0"/>
+              <a:t>Data &amp; observation process are uncertain</a:t>
+            </a:r>
+          </a:p>
+          <a:p>
+            <a:r>
+              <a:rPr lang="en-GB" dirty="0"/>
+              <a:t>Centred on P[model, </a:t>
+            </a:r>
+            <a:r>
+              <a:rPr lang="en-GB" dirty="0" err="1"/>
+              <a:t>obs</a:t>
+            </a:r>
+            <a:r>
+              <a:rPr lang="en-GB" dirty="0"/>
+              <a:t> process | data]</a:t>
+            </a:r>
+          </a:p>
+        </p:txBody>
+      </p:sp>
+      <p:sp>
+        <p:nvSpPr>
+          <p:cNvPr id="9" name="TextBox 8">
+            <a:extLst>
+              <a:ext uri="{FF2B5EF4-FFF2-40B4-BE49-F238E27FC236}">
+                <a16:creationId xmlns:a16="http://schemas.microsoft.com/office/drawing/2014/main" id="{5480AD36-E6B0-763A-56FC-8BCDB3D385D5}"/>
+              </a:ext>
+            </a:extLst>
+          </p:cNvPr>
+          <p:cNvSpPr txBox="1"/>
+          <p:nvPr/>
+        </p:nvSpPr>
+        <p:spPr>
+          <a:xfrm>
+            <a:off x="2348331" y="1492530"/>
+            <a:ext cx="2279150" cy="369332"/>
+          </a:xfrm>
+          <a:prstGeom prst="rect">
+            <a:avLst/>
+          </a:prstGeom>
+          <a:noFill/>
+        </p:spPr>
+        <p:txBody>
+          <a:bodyPr wrap="none" rtlCol="0">
+            <a:spAutoFit/>
+          </a:bodyPr>
+          <a:lstStyle/>
+          <a:p>
+            <a:r>
+              <a:rPr lang="en-GB" dirty="0"/>
+              <a:t>Conventional statistics</a:t>
+            </a:r>
+          </a:p>
+        </p:txBody>
+      </p:sp>
+      <p:sp>
+        <p:nvSpPr>
+          <p:cNvPr id="10" name="TextBox 9">
+            <a:extLst>
+              <a:ext uri="{FF2B5EF4-FFF2-40B4-BE49-F238E27FC236}">
+                <a16:creationId xmlns:a16="http://schemas.microsoft.com/office/drawing/2014/main" id="{DCB50263-3AD3-F6EF-CB0A-B4D5E31C6D3B}"/>
+              </a:ext>
+            </a:extLst>
+          </p:cNvPr>
+          <p:cNvSpPr txBox="1"/>
+          <p:nvPr/>
+        </p:nvSpPr>
+        <p:spPr>
+          <a:xfrm>
+            <a:off x="7132840" y="1416670"/>
+            <a:ext cx="3485634" cy="369332"/>
+          </a:xfrm>
+          <a:prstGeom prst="rect">
+            <a:avLst/>
+          </a:prstGeom>
+          <a:noFill/>
+        </p:spPr>
+        <p:txBody>
+          <a:bodyPr wrap="none" rtlCol="0">
+            <a:spAutoFit/>
+          </a:bodyPr>
+          <a:lstStyle/>
+          <a:p>
+            <a:r>
+              <a:rPr lang="en-GB" dirty="0"/>
+              <a:t>Conditional probability (Bayes rule)</a:t>
+            </a:r>
+          </a:p>
+        </p:txBody>
+      </p:sp>
+      <p:sp>
+        <p:nvSpPr>
+          <p:cNvPr id="11" name="Flowchart: Connector 10">
+            <a:extLst>
+              <a:ext uri="{FF2B5EF4-FFF2-40B4-BE49-F238E27FC236}">
+                <a16:creationId xmlns:a16="http://schemas.microsoft.com/office/drawing/2014/main" id="{AF69AA61-341C-2BCA-4B18-F5C555585299}"/>
+              </a:ext>
+            </a:extLst>
+          </p:cNvPr>
+          <p:cNvSpPr/>
+          <p:nvPr/>
+        </p:nvSpPr>
+        <p:spPr>
+          <a:xfrm>
+            <a:off x="9086757" y="2091764"/>
+            <a:ext cx="1618019" cy="1575979"/>
+          </a:xfrm>
+          <a:prstGeom prst="flowChartConnector">
+            <a:avLst/>
+          </a:prstGeom>
+          <a:noFill/>
+          <a:ln>
+            <a:prstDash val="dash"/>
+          </a:ln>
+        </p:spPr>
+        <p:style>
+          <a:lnRef idx="2">
+            <a:schemeClr val="accent3"/>
+          </a:lnRef>
+          <a:fillRef idx="1">
+            <a:schemeClr val="lt1"/>
+          </a:fillRef>
+          <a:effectRef idx="0">
+            <a:schemeClr val="accent3"/>
+          </a:effectRef>
+          <a:fontRef idx="minor">
+            <a:schemeClr val="dk1"/>
+          </a:fontRef>
+        </p:style>
+        <p:txBody>
+          <a:bodyPr rtlCol="0" anchor="ctr"/>
+          <a:lstStyle/>
+          <a:p>
+            <a:pPr algn="ctr"/>
+            <a:endParaRPr lang="en-GB" dirty="0">
+              <a:solidFill>
+                <a:schemeClr val="tx1"/>
+              </a:solidFill>
+            </a:endParaRPr>
+          </a:p>
+        </p:txBody>
+      </p:sp>
+      <p:sp>
+        <p:nvSpPr>
+          <p:cNvPr id="12" name="Star: 24 Points 11">
+            <a:extLst>
+              <a:ext uri="{FF2B5EF4-FFF2-40B4-BE49-F238E27FC236}">
+                <a16:creationId xmlns:a16="http://schemas.microsoft.com/office/drawing/2014/main" id="{D44A329C-E68C-9A6D-9BF0-10361258BF7F}"/>
+              </a:ext>
+            </a:extLst>
+          </p:cNvPr>
+          <p:cNvSpPr>
+            <a:spLocks noChangeAspect="1"/>
+          </p:cNvSpPr>
+          <p:nvPr/>
+        </p:nvSpPr>
+        <p:spPr>
+          <a:xfrm>
+            <a:off x="9992249" y="3076631"/>
+            <a:ext cx="1425053" cy="704738"/>
+          </a:xfrm>
+          <a:prstGeom prst="star24">
+            <a:avLst/>
+          </a:prstGeom>
+        </p:spPr>
+        <p:style>
+          <a:lnRef idx="2">
+            <a:schemeClr val="accent4">
+              <a:shade val="15000"/>
+            </a:schemeClr>
+          </a:lnRef>
+          <a:fillRef idx="1">
+            <a:schemeClr val="accent4"/>
+          </a:fillRef>
+          <a:effectRef idx="0">
+            <a:schemeClr val="accent4"/>
+          </a:effectRef>
+          <a:fontRef idx="minor">
+            <a:schemeClr val="lt1"/>
+          </a:fontRef>
+        </p:style>
+        <p:txBody>
+          <a:bodyPr rtlCol="0" anchor="ctr"/>
+          <a:lstStyle/>
+          <a:p>
+            <a:pPr algn="ctr"/>
+            <a:r>
+              <a:rPr lang="en-GB" sz="1400" dirty="0" err="1">
+                <a:solidFill>
+                  <a:schemeClr val="tx1"/>
+                </a:solidFill>
+              </a:rPr>
+              <a:t>obs</a:t>
+            </a:r>
+            <a:endParaRPr lang="en-GB" sz="1400" dirty="0">
+              <a:solidFill>
+                <a:schemeClr val="tx1"/>
+              </a:solidFill>
+            </a:endParaRPr>
+          </a:p>
+          <a:p>
+            <a:pPr algn="ctr"/>
+            <a:r>
+              <a:rPr lang="en-GB" sz="1400" dirty="0">
+                <a:solidFill>
+                  <a:schemeClr val="tx1"/>
+                </a:solidFill>
+              </a:rPr>
+              <a:t>process</a:t>
+            </a:r>
+          </a:p>
+        </p:txBody>
+      </p:sp>
+    </p:spTree>
+    <p:extLst>
+      <p:ext uri="{BB962C8B-B14F-4D97-AF65-F5344CB8AC3E}">
+        <p14:creationId xmlns:p14="http://schemas.microsoft.com/office/powerpoint/2010/main" val="1205933187"/>
+      </p:ext>
+    </p:extLst>
+  </p:cSld>
+  <p:clrMapOvr>
+    <a:masterClrMapping/>
+  </p:clrMapOvr>
 </p:sld>
 </file>
 

</xml_diff>